<commit_message>
Loading fixed. New Catalog's get_models method created.
</commit_message>
<xml_diff>
--- a/resources/Logo Base Image.pptx
+++ b/resources/Logo Base Image.pptx
@@ -272,7 +272,7 @@
           <a:p>
             <a:fld id="{DDB90091-DC18-4D0F-A6AF-0CD5AE9FEA3D}" type="datetimeFigureOut">
               <a:rPr lang="en-150" smtClean="0"/>
-              <a:t>03/07/2024</a:t>
+              <a:t>06/08/2024</a:t>
             </a:fld>
             <a:endParaRPr lang="en-150"/>
           </a:p>
@@ -472,7 +472,7 @@
           <a:p>
             <a:fld id="{DDB90091-DC18-4D0F-A6AF-0CD5AE9FEA3D}" type="datetimeFigureOut">
               <a:rPr lang="en-150" smtClean="0"/>
-              <a:t>03/07/2024</a:t>
+              <a:t>06/08/2024</a:t>
             </a:fld>
             <a:endParaRPr lang="en-150"/>
           </a:p>
@@ -682,7 +682,7 @@
           <a:p>
             <a:fld id="{DDB90091-DC18-4D0F-A6AF-0CD5AE9FEA3D}" type="datetimeFigureOut">
               <a:rPr lang="en-150" smtClean="0"/>
-              <a:t>03/07/2024</a:t>
+              <a:t>06/08/2024</a:t>
             </a:fld>
             <a:endParaRPr lang="en-150"/>
           </a:p>
@@ -882,7 +882,7 @@
           <a:p>
             <a:fld id="{DDB90091-DC18-4D0F-A6AF-0CD5AE9FEA3D}" type="datetimeFigureOut">
               <a:rPr lang="en-150" smtClean="0"/>
-              <a:t>03/07/2024</a:t>
+              <a:t>06/08/2024</a:t>
             </a:fld>
             <a:endParaRPr lang="en-150"/>
           </a:p>
@@ -1158,7 +1158,7 @@
           <a:p>
             <a:fld id="{DDB90091-DC18-4D0F-A6AF-0CD5AE9FEA3D}" type="datetimeFigureOut">
               <a:rPr lang="en-150" smtClean="0"/>
-              <a:t>03/07/2024</a:t>
+              <a:t>06/08/2024</a:t>
             </a:fld>
             <a:endParaRPr lang="en-150"/>
           </a:p>
@@ -1426,7 +1426,7 @@
           <a:p>
             <a:fld id="{DDB90091-DC18-4D0F-A6AF-0CD5AE9FEA3D}" type="datetimeFigureOut">
               <a:rPr lang="en-150" smtClean="0"/>
-              <a:t>03/07/2024</a:t>
+              <a:t>06/08/2024</a:t>
             </a:fld>
             <a:endParaRPr lang="en-150"/>
           </a:p>
@@ -1841,7 +1841,7 @@
           <a:p>
             <a:fld id="{DDB90091-DC18-4D0F-A6AF-0CD5AE9FEA3D}" type="datetimeFigureOut">
               <a:rPr lang="en-150" smtClean="0"/>
-              <a:t>03/07/2024</a:t>
+              <a:t>06/08/2024</a:t>
             </a:fld>
             <a:endParaRPr lang="en-150"/>
           </a:p>
@@ -1983,7 +1983,7 @@
           <a:p>
             <a:fld id="{DDB90091-DC18-4D0F-A6AF-0CD5AE9FEA3D}" type="datetimeFigureOut">
               <a:rPr lang="en-150" smtClean="0"/>
-              <a:t>03/07/2024</a:t>
+              <a:t>06/08/2024</a:t>
             </a:fld>
             <a:endParaRPr lang="en-150"/>
           </a:p>
@@ -2096,7 +2096,7 @@
           <a:p>
             <a:fld id="{DDB90091-DC18-4D0F-A6AF-0CD5AE9FEA3D}" type="datetimeFigureOut">
               <a:rPr lang="en-150" smtClean="0"/>
-              <a:t>03/07/2024</a:t>
+              <a:t>06/08/2024</a:t>
             </a:fld>
             <a:endParaRPr lang="en-150"/>
           </a:p>
@@ -2409,7 +2409,7 @@
           <a:p>
             <a:fld id="{DDB90091-DC18-4D0F-A6AF-0CD5AE9FEA3D}" type="datetimeFigureOut">
               <a:rPr lang="en-150" smtClean="0"/>
-              <a:t>03/07/2024</a:t>
+              <a:t>06/08/2024</a:t>
             </a:fld>
             <a:endParaRPr lang="en-150"/>
           </a:p>
@@ -2698,7 +2698,7 @@
           <a:p>
             <a:fld id="{DDB90091-DC18-4D0F-A6AF-0CD5AE9FEA3D}" type="datetimeFigureOut">
               <a:rPr lang="en-150" smtClean="0"/>
-              <a:t>03/07/2024</a:t>
+              <a:t>06/08/2024</a:t>
             </a:fld>
             <a:endParaRPr lang="en-150"/>
           </a:p>
@@ -2941,7 +2941,7 @@
           <a:p>
             <a:fld id="{DDB90091-DC18-4D0F-A6AF-0CD5AE9FEA3D}" type="datetimeFigureOut">
               <a:rPr lang="en-150" smtClean="0"/>
-              <a:t>03/07/2024</a:t>
+              <a:t>06/08/2024</a:t>
             </a:fld>
             <a:endParaRPr lang="en-150"/>
           </a:p>
@@ -3386,7 +3386,7 @@
         </p:blipFill>
         <p:spPr>
           <a:xfrm>
-            <a:off x="0" y="1752600"/>
+            <a:off x="0" y="995218"/>
             <a:ext cx="12192000" cy="3352800"/>
           </a:xfrm>
           <a:prstGeom prst="rect">
@@ -3408,8 +3408,8 @@
         </p:nvSpPr>
         <p:spPr>
           <a:xfrm>
-            <a:off x="3263900" y="4800600"/>
-            <a:ext cx="5664200" cy="2646878"/>
+            <a:off x="3790372" y="4070926"/>
+            <a:ext cx="6933047" cy="2646878"/>
           </a:xfrm>
           <a:prstGeom prst="rect">
             <a:avLst/>
@@ -3430,7 +3430,7 @@
                 <a:latin typeface="always  forever" pitchFamily="2" charset="0"/>
                 <a:cs typeface="Libertinus Keyboard" pitchFamily="50" charset="-79"/>
               </a:rPr>
-              <a:t>U T I L S</a:t>
+              <a:t>Python  LIB</a:t>
             </a:r>
             <a:endParaRPr lang="en-150" sz="16600" b="1" dirty="0">
               <a:solidFill>

</xml_diff>